<commit_message>
(-,+,*)  list done,  all headers sizes done
</commit_message>
<xml_diff>
--- a/Presentation.pptx
+++ b/Presentation.pptx
@@ -1067,8 +1067,10 @@
           <a:bodyPr wrap="square" rtlCol="0" anchor="ctr"/>
           <a:lstStyle/>
           <a:p>
-            <a:pPr algn="ctr"/>
-            <a:endParaRPr lang="en-US" sz="2500" dirty="0"/>
+            <a:pPr algn="ctr" indent="0" marL="0">
+              <a:buNone/>
+            </a:pPr>
+            <a:endParaRPr lang="en-US" dirty="0"/>
           </a:p>
         </p:txBody>
       </p:sp>
@@ -1093,8 +1095,10 @@
           <a:bodyPr wrap="square" rtlCol="0" anchor="ctr"/>
           <a:lstStyle/>
           <a:p>
-            <a:pPr algn="ctr"/>
-            <a:endParaRPr lang="en-US" sz="2500" dirty="0"/>
+            <a:pPr algn="ctr" indent="0" marL="0">
+              <a:buNone/>
+            </a:pPr>
+            <a:endParaRPr lang="en-US" dirty="0"/>
           </a:p>
         </p:txBody>
       </p:sp>
@@ -1119,14 +1123,16 @@
           <a:bodyPr wrap="square" rtlCol="0" anchor="ctr"/>
           <a:lstStyle/>
           <a:p>
-            <a:pPr algn="ctr"/>
+            <a:pPr algn="ctr" indent="0" marL="0">
+              <a:buNone/>
+            </a:pPr>
             <a:r>
-              <a:rPr lang="en-US" sz="5500" dirty="0">
+              <a:rPr lang="en-US" sz="5500" b="0" dirty="0">
                 <a:solidFill>
                   <a:srgbClr val="000000"/>
                 </a:solidFill>
               </a:rPr>
-              <a:t># Hello, Marpit!</a:t>
+              <a:t> Hello, Marpit!</a:t>
             </a:r>
             <a:endParaRPr lang="en-US" sz="5500" dirty="0"/>
           </a:p>
@@ -1153,8 +1159,10 @@
           <a:bodyPr wrap="square" rtlCol="0" anchor="ctr"/>
           <a:lstStyle/>
           <a:p>
-            <a:pPr algn="ctr"/>
-            <a:endParaRPr lang="en-US" sz="2500" dirty="0"/>
+            <a:pPr algn="ctr" indent="0" marL="0">
+              <a:buNone/>
+            </a:pPr>
+            <a:endParaRPr lang="en-US" dirty="0"/>
           </a:p>
         </p:txBody>
       </p:sp>
@@ -1179,16 +1187,18 @@
           <a:bodyPr wrap="square" rtlCol="0" anchor="ctr"/>
           <a:lstStyle/>
           <a:p>
-            <a:pPr algn="ctr"/>
+            <a:pPr algn="ctr" indent="0" marL="0">
+              <a:buNone/>
+            </a:pPr>
             <a:r>
-              <a:rPr lang="en-US" sz="2500" dirty="0">
+              <a:rPr lang="en-US" b="0" dirty="0">
                 <a:solidFill>
                   <a:srgbClr val="000000"/>
                 </a:solidFill>
               </a:rPr>
               <a:t> Marpit is the skinny framework for creating slide deck from Markdown.</a:t>
             </a:r>
-            <a:endParaRPr lang="en-US" sz="2500" dirty="0"/>
+            <a:endParaRPr lang="en-US" dirty="0"/>
           </a:p>
         </p:txBody>
       </p:sp>
@@ -1213,8 +1223,10 @@
           <a:bodyPr wrap="square" rtlCol="0" anchor="ctr"/>
           <a:lstStyle/>
           <a:p>
-            <a:pPr algn="ctr"/>
-            <a:endParaRPr lang="en-US" sz="2500" dirty="0"/>
+            <a:pPr algn="ctr" indent="0" marL="0">
+              <a:buNone/>
+            </a:pPr>
+            <a:endParaRPr lang="en-US" dirty="0"/>
           </a:p>
         </p:txBody>
       </p:sp>
@@ -1264,8 +1276,10 @@
           <a:bodyPr wrap="square" rtlCol="0" anchor="ctr"/>
           <a:lstStyle/>
           <a:p>
-            <a:pPr algn="ctr"/>
-            <a:endParaRPr lang="en-US" sz="2500" dirty="0"/>
+            <a:pPr algn="ctr" indent="0" marL="0">
+              <a:buNone/>
+            </a:pPr>
+            <a:endParaRPr lang="en-US" dirty="0"/>
           </a:p>
         </p:txBody>
       </p:sp>
@@ -1278,7 +1292,7 @@
         <p:spPr>
           <a:xfrm>
             <a:off x="0" y="365760"/>
-            <a:ext cx="9144000" cy="457200"/>
+            <a:ext cx="9144000" cy="365760"/>
           </a:xfrm>
           <a:prstGeom prst="rect">
             <a:avLst/>
@@ -1290,16 +1304,18 @@
           <a:bodyPr wrap="square" rtlCol="0" anchor="ctr"/>
           <a:lstStyle/>
           <a:p>
-            <a:pPr algn="ctr"/>
+            <a:pPr algn="ctr" indent="0" marL="0">
+              <a:buNone/>
+            </a:pPr>
             <a:r>
-              <a:rPr lang="en-US" sz="5500" dirty="0">
+              <a:rPr lang="en-US" sz="5000" b="0" dirty="0">
                 <a:solidFill>
                   <a:srgbClr val="000000"/>
                 </a:solidFill>
               </a:rPr>
-              <a:t>## Ready to convert into PDF!</a:t>
+              <a:t> Ready to convert into PDF!</a:t>
             </a:r>
-            <a:endParaRPr lang="en-US" sz="5500" dirty="0"/>
+            <a:endParaRPr lang="en-US" sz="5000" dirty="0"/>
           </a:p>
         </p:txBody>
       </p:sp>
@@ -1324,8 +1340,10 @@
           <a:bodyPr wrap="square" rtlCol="0" anchor="ctr"/>
           <a:lstStyle/>
           <a:p>
-            <a:pPr algn="ctr"/>
-            <a:endParaRPr lang="en-US" sz="2500" dirty="0"/>
+            <a:pPr algn="ctr" indent="0" marL="0">
+              <a:buNone/>
+            </a:pPr>
+            <a:endParaRPr lang="en-US" dirty="0"/>
           </a:p>
         </p:txBody>
       </p:sp>
@@ -1350,16 +1368,18 @@
           <a:bodyPr wrap="square" rtlCol="0" anchor="ctr"/>
           <a:lstStyle/>
           <a:p>
-            <a:pPr algn="ctr"/>
+            <a:pPr algn="ctr" indent="0" marL="0">
+              <a:buNone/>
+            </a:pPr>
             <a:r>
-              <a:rPr lang="en-US" sz="2500" dirty="0">
+              <a:rPr lang="en-US" b="0" dirty="0">
                 <a:solidFill>
                   <a:srgbClr val="000000"/>
                 </a:solidFill>
               </a:rPr>
               <a:t>You can convert into PDF slide deck through Chrome.</a:t>
             </a:r>
-            <a:endParaRPr lang="en-US" sz="2500" dirty="0"/>
+            <a:endParaRPr lang="en-US" dirty="0"/>
           </a:p>
         </p:txBody>
       </p:sp>
@@ -1397,43 +1417,6 @@
         <p:spPr>
           <a:xfrm>
             <a:off x="0" y="137160"/>
-            <a:ext cx="9144000" cy="457200"/>
-          </a:xfrm>
-          <a:prstGeom prst="rect">
-            <a:avLst/>
-          </a:prstGeom>
-          <a:noFill/>
-          <a:ln/>
-        </p:spPr>
-        <p:txBody>
-          <a:bodyPr wrap="square" rtlCol="0" anchor="ctr"/>
-          <a:lstStyle/>
-          <a:p>
-            <a:pPr algn="ctr" marL="342900" indent="-342900">
-              <a:buSzPct val="100000"/>
-              <a:buChar char="•"/>
-            </a:pPr>
-            <a:r>
-              <a:rPr lang="en-US" sz="3000" dirty="0">
-                <a:solidFill>
-                  <a:srgbClr val="000000"/>
-                </a:solidFill>
-              </a:rPr>
-              <a:t>- Revenue was off the chart.</a:t>
-            </a:r>
-            <a:endParaRPr lang="en-US" sz="3000" dirty="0"/>
-          </a:p>
-        </p:txBody>
-      </p:sp>
-      <p:sp>
-        <p:nvSpPr>
-          <p:cNvPr id="3" name="Text 1"/>
-          <p:cNvSpPr/>
-          <p:nvPr/>
-        </p:nvSpPr>
-        <p:spPr>
-          <a:xfrm>
-            <a:off x="0" y="365760"/>
             <a:ext cx="9144000" cy="1371600"/>
           </a:xfrm>
           <a:prstGeom prst="rect">
@@ -1446,20 +1429,68 @@
           <a:bodyPr wrap="square" rtlCol="0" anchor="ctr"/>
           <a:lstStyle/>
           <a:p>
-            <a:pPr algn="ctr"/>
+            <a:pPr algn="ctr" marL="342900" indent="-342900">
+              <a:buSzPct val="100000"/>
+              <a:buChar char="•"/>
+            </a:pPr>
             <a:endParaRPr lang="en-US" sz="2500" dirty="0"/>
           </a:p>
-        </p:txBody>
-      </p:sp>
-      <p:sp>
-        <p:nvSpPr>
-          <p:cNvPr id="4" name="Text 2"/>
+          <a:p>
+            <a:pPr algn="ctr" marL="342900" indent="-342900">
+              <a:buSzPct val="100000"/>
+              <a:buChar char="•"/>
+            </a:pPr>
+            <a:r>
+              <a:rPr lang="en-US" sz="2500" b="0" dirty="0">
+                <a:solidFill>
+                  <a:srgbClr val="000000"/>
+                </a:solidFill>
+              </a:rPr>
+              <a:t> list item1.</a:t>
+            </a:r>
+            <a:endParaRPr lang="en-US" sz="2500" dirty="0"/>
+          </a:p>
+          <a:p>
+            <a:pPr algn="ctr" marL="342900" indent="-342900">
+              <a:buSzPct val="100000"/>
+              <a:buChar char="•"/>
+            </a:pPr>
+            <a:r>
+              <a:rPr lang="en-US" sz="2500" b="0" dirty="0">
+                <a:solidFill>
+                  <a:srgbClr val="000000"/>
+                </a:solidFill>
+              </a:rPr>
+              <a:t> list item2.</a:t>
+            </a:r>
+            <a:endParaRPr lang="en-US" sz="2500" dirty="0"/>
+          </a:p>
+          <a:p>
+            <a:pPr algn="ctr" marL="342900" indent="-342900">
+              <a:buSzPct val="100000"/>
+              <a:buChar char="•"/>
+            </a:pPr>
+            <a:r>
+              <a:rPr lang="en-US" sz="2500" b="0" dirty="0">
+                <a:solidFill>
+                  <a:srgbClr val="000000"/>
+                </a:solidFill>
+              </a:rPr>
+              <a:t> list item3.</a:t>
+            </a:r>
+            <a:endParaRPr lang="en-US" sz="2500" dirty="0"/>
+          </a:p>
+        </p:txBody>
+      </p:sp>
+      <p:sp>
+        <p:nvSpPr>
+          <p:cNvPr id="3" name="Text 1"/>
           <p:cNvSpPr/>
           <p:nvPr/>
         </p:nvSpPr>
         <p:spPr>
           <a:xfrm>
-            <a:off x="0" y="594360"/>
+            <a:off x="0" y="1234440"/>
             <a:ext cx="9144000" cy="1371600"/>
           </a:xfrm>
           <a:prstGeom prst="rect">
@@ -1472,8 +1503,46 @@
           <a:bodyPr wrap="square" rtlCol="0" anchor="ctr"/>
           <a:lstStyle/>
           <a:p>
-            <a:pPr algn="ctr"/>
-            <a:endParaRPr lang="en-US" sz="2500" dirty="0"/>
+            <a:pPr algn="ctr" indent="0" marL="0">
+              <a:buNone/>
+            </a:pPr>
+            <a:r>
+              <a:rPr lang="en-US" b="0" dirty="0">
+                <a:solidFill>
+                  <a:srgbClr val="000000"/>
+                </a:solidFill>
+              </a:rPr>
+              <a:t>texto normal</a:t>
+            </a:r>
+            <a:endParaRPr lang="en-US" dirty="0"/>
+          </a:p>
+        </p:txBody>
+      </p:sp>
+      <p:sp>
+        <p:nvSpPr>
+          <p:cNvPr id="4" name="Text 2"/>
+          <p:cNvSpPr/>
+          <p:nvPr/>
+        </p:nvSpPr>
+        <p:spPr>
+          <a:xfrm>
+            <a:off x="0" y="1463040"/>
+            <a:ext cx="9144000" cy="1371600"/>
+          </a:xfrm>
+          <a:prstGeom prst="rect">
+            <a:avLst/>
+          </a:prstGeom>
+          <a:noFill/>
+          <a:ln/>
+        </p:spPr>
+        <p:txBody>
+          <a:bodyPr wrap="square" rtlCol="0" anchor="ctr"/>
+          <a:lstStyle/>
+          <a:p>
+            <a:pPr algn="ctr" indent="0" marL="0">
+              <a:buNone/>
+            </a:pPr>
+            <a:endParaRPr lang="en-US" dirty="0"/>
           </a:p>
         </p:txBody>
       </p:sp>

</xml_diff>